<commit_message>
updating figure and first draft of code
</commit_message>
<xml_diff>
--- a/lab4_fig.pptx
+++ b/lab4_fig.pptx
@@ -7291,6 +7291,150 @@
           </a:fontRef>
         </p:style>
       </p:cxnSp>
+      <p:sp>
+        <p:nvSpPr>
+          <p:cNvPr id="90" name="TextBox 89">
+            <a:extLst>
+              <a:ext uri="{FF2B5EF4-FFF2-40B4-BE49-F238E27FC236}">
+                <a16:creationId xmlns:a16="http://schemas.microsoft.com/office/drawing/2014/main" id="{5B46F91C-FE52-E636-8F7D-B2AD833D873E}"/>
+              </a:ext>
+            </a:extLst>
+          </p:cNvPr>
+          <p:cNvSpPr txBox="1"/>
+          <p:nvPr/>
+        </p:nvSpPr>
+        <p:spPr>
+          <a:xfrm>
+            <a:off x="2093874" y="2719732"/>
+            <a:ext cx="531274" cy="307777"/>
+          </a:xfrm>
+          <a:prstGeom prst="rect">
+            <a:avLst/>
+          </a:prstGeom>
+          <a:noFill/>
+        </p:spPr>
+        <p:txBody>
+          <a:bodyPr wrap="square" rtlCol="0">
+            <a:spAutoFit/>
+          </a:bodyPr>
+          <a:lstStyle/>
+          <a:p>
+            <a:pPr algn="ctr"/>
+            <a:r>
+              <a:rPr lang="en-US" sz="1400" dirty="0"/>
+              <a:t>PE 0</a:t>
+            </a:r>
+          </a:p>
+        </p:txBody>
+      </p:sp>
+      <p:sp>
+        <p:nvSpPr>
+          <p:cNvPr id="91" name="TextBox 90">
+            <a:extLst>
+              <a:ext uri="{FF2B5EF4-FFF2-40B4-BE49-F238E27FC236}">
+                <a16:creationId xmlns:a16="http://schemas.microsoft.com/office/drawing/2014/main" id="{2ABEF34D-991D-ECC1-6C51-C256D7A0AC4F}"/>
+              </a:ext>
+            </a:extLst>
+          </p:cNvPr>
+          <p:cNvSpPr txBox="1"/>
+          <p:nvPr/>
+        </p:nvSpPr>
+        <p:spPr>
+          <a:xfrm>
+            <a:off x="3547207" y="2722001"/>
+            <a:ext cx="531274" cy="307777"/>
+          </a:xfrm>
+          <a:prstGeom prst="rect">
+            <a:avLst/>
+          </a:prstGeom>
+          <a:noFill/>
+        </p:spPr>
+        <p:txBody>
+          <a:bodyPr wrap="square" rtlCol="0">
+            <a:spAutoFit/>
+          </a:bodyPr>
+          <a:lstStyle/>
+          <a:p>
+            <a:pPr algn="ctr"/>
+            <a:r>
+              <a:rPr lang="en-US" sz="1400" dirty="0"/>
+              <a:t>PE 1</a:t>
+            </a:r>
+          </a:p>
+        </p:txBody>
+      </p:sp>
+      <p:sp>
+        <p:nvSpPr>
+          <p:cNvPr id="92" name="TextBox 91">
+            <a:extLst>
+              <a:ext uri="{FF2B5EF4-FFF2-40B4-BE49-F238E27FC236}">
+                <a16:creationId xmlns:a16="http://schemas.microsoft.com/office/drawing/2014/main" id="{A3FA335C-8DB4-5D88-AC83-3B7FF90500AC}"/>
+              </a:ext>
+            </a:extLst>
+          </p:cNvPr>
+          <p:cNvSpPr txBox="1"/>
+          <p:nvPr/>
+        </p:nvSpPr>
+        <p:spPr>
+          <a:xfrm>
+            <a:off x="2084653" y="1251985"/>
+            <a:ext cx="531274" cy="307777"/>
+          </a:xfrm>
+          <a:prstGeom prst="rect">
+            <a:avLst/>
+          </a:prstGeom>
+          <a:noFill/>
+        </p:spPr>
+        <p:txBody>
+          <a:bodyPr wrap="square" rtlCol="0">
+            <a:spAutoFit/>
+          </a:bodyPr>
+          <a:lstStyle/>
+          <a:p>
+            <a:pPr algn="ctr"/>
+            <a:r>
+              <a:rPr lang="en-US" sz="1400" dirty="0"/>
+              <a:t>PE 2</a:t>
+            </a:r>
+          </a:p>
+        </p:txBody>
+      </p:sp>
+      <p:sp>
+        <p:nvSpPr>
+          <p:cNvPr id="93" name="TextBox 92">
+            <a:extLst>
+              <a:ext uri="{FF2B5EF4-FFF2-40B4-BE49-F238E27FC236}">
+                <a16:creationId xmlns:a16="http://schemas.microsoft.com/office/drawing/2014/main" id="{21A97F54-F50F-96E1-FAA9-8433C9A205E4}"/>
+              </a:ext>
+            </a:extLst>
+          </p:cNvPr>
+          <p:cNvSpPr txBox="1"/>
+          <p:nvPr/>
+        </p:nvSpPr>
+        <p:spPr>
+          <a:xfrm>
+            <a:off x="3561294" y="1260134"/>
+            <a:ext cx="531274" cy="307777"/>
+          </a:xfrm>
+          <a:prstGeom prst="rect">
+            <a:avLst/>
+          </a:prstGeom>
+          <a:noFill/>
+        </p:spPr>
+        <p:txBody>
+          <a:bodyPr wrap="square" rtlCol="0">
+            <a:spAutoFit/>
+          </a:bodyPr>
+          <a:lstStyle/>
+          <a:p>
+            <a:pPr algn="ctr"/>
+            <a:r>
+              <a:rPr lang="en-US" sz="1400" dirty="0"/>
+              <a:t>PE 3</a:t>
+            </a:r>
+          </a:p>
+        </p:txBody>
+      </p:sp>
     </p:spTree>
     <p:extLst>
       <p:ext uri="{BB962C8B-B14F-4D97-AF65-F5344CB8AC3E}">

</xml_diff>